<commit_message>
change scss and pptx
</commit_message>
<xml_diff>
--- a/template.pptx
+++ b/template.pptx
@@ -211,7 +211,7 @@
           <a:p>
             <a:fld id="{0F9C1CCF-B725-44A7-AA57-5E433BD85C9F}" type="datetimeFigureOut">
               <a:rPr lang="en-US" smtClean="0"/>
-              <a:t>1/2/22</a:t>
+              <a:t>11/14/24</a:t>
             </a:fld>
             <a:endParaRPr lang="en-US"/>
           </a:p>
@@ -864,7 +864,7 @@
           <a:p>
             <a:fld id="{241EB5C9-1307-BA42-ABA2-0BC069CD8E7F}" type="datetimeFigureOut">
               <a:rPr lang="en-US" smtClean="0"/>
-              <a:t>1/2/22</a:t>
+              <a:t>11/14/24</a:t>
             </a:fld>
             <a:endParaRPr lang="en-US"/>
           </a:p>
@@ -1032,7 +1032,7 @@
           <a:p>
             <a:fld id="{241EB5C9-1307-BA42-ABA2-0BC069CD8E7F}" type="datetimeFigureOut">
               <a:rPr lang="en-US" smtClean="0"/>
-              <a:t>1/2/22</a:t>
+              <a:t>11/14/24</a:t>
             </a:fld>
             <a:endParaRPr lang="en-US"/>
           </a:p>
@@ -1210,7 +1210,7 @@
           <a:p>
             <a:fld id="{241EB5C9-1307-BA42-ABA2-0BC069CD8E7F}" type="datetimeFigureOut">
               <a:rPr lang="en-US" smtClean="0"/>
-              <a:t>1/2/22</a:t>
+              <a:t>11/14/24</a:t>
             </a:fld>
             <a:endParaRPr lang="en-US"/>
           </a:p>
@@ -1262,6 +1262,315 @@
     <p:extLst>
       <p:ext uri="{BB962C8B-B14F-4D97-AF65-F5344CB8AC3E}">
         <p14:creationId xmlns:p14="http://schemas.microsoft.com/office/powerpoint/2010/main" val="2581529045"/>
+      </p:ext>
+    </p:extLst>
+  </p:cSld>
+  <p:clrMapOvr>
+    <a:masterClrMapping/>
+  </p:clrMapOvr>
+</p:sldLayout>
+</file>
+
+<file path=ppt/slideLayouts/slideLayout12.xml><?xml version="1.0" encoding="utf-8"?>
+<p:sldLayout xmlns:a="http://schemas.openxmlformats.org/drawingml/2006/main" xmlns:r="http://schemas.openxmlformats.org/officeDocument/2006/relationships" xmlns:p="http://schemas.openxmlformats.org/presentationml/2006/main" type="vertTitleAndTx" preserve="1">
+  <p:cSld name="1_Vertical Title and Text">
+    <p:spTree>
+      <p:nvGrpSpPr>
+        <p:cNvPr id="1" name=""/>
+        <p:cNvGrpSpPr/>
+        <p:nvPr/>
+      </p:nvGrpSpPr>
+      <p:grpSpPr>
+        <a:xfrm>
+          <a:off x="0" y="0"/>
+          <a:ext cx="0" cy="0"/>
+          <a:chOff x="0" y="0"/>
+          <a:chExt cx="0" cy="0"/>
+        </a:xfrm>
+      </p:grpSpPr>
+      <p:sp>
+        <p:nvSpPr>
+          <p:cNvPr id="2" name="Vertical Title 1"/>
+          <p:cNvSpPr>
+            <a:spLocks noGrp="1"/>
+          </p:cNvSpPr>
+          <p:nvPr>
+            <p:ph type="title" orient="vert"/>
+          </p:nvPr>
+        </p:nvSpPr>
+        <p:spPr>
+          <a:xfrm>
+            <a:off x="6629400" y="205979"/>
+            <a:ext cx="2057400" cy="4388644"/>
+          </a:xfrm>
+        </p:spPr>
+        <p:txBody>
+          <a:bodyPr vert="eaVert"/>
+          <a:lstStyle/>
+          <a:p>
+            <a:r>
+              <a:rPr lang="en-US"/>
+              <a:t>Click to edit Master title style</a:t>
+            </a:r>
+          </a:p>
+        </p:txBody>
+      </p:sp>
+      <p:sp>
+        <p:nvSpPr>
+          <p:cNvPr id="3" name="Vertical Text Placeholder 2"/>
+          <p:cNvSpPr>
+            <a:spLocks noGrp="1"/>
+          </p:cNvSpPr>
+          <p:nvPr>
+            <p:ph type="body" orient="vert" idx="1"/>
+          </p:nvPr>
+        </p:nvSpPr>
+        <p:spPr>
+          <a:xfrm>
+            <a:off x="457200" y="205979"/>
+            <a:ext cx="6019800" cy="4388644"/>
+          </a:xfrm>
+        </p:spPr>
+        <p:txBody>
+          <a:bodyPr vert="eaVert"/>
+          <a:lstStyle/>
+          <a:p>
+            <a:pPr lvl="0"/>
+            <a:r>
+              <a:rPr lang="en-US"/>
+              <a:t>Click to edit Master text styles</a:t>
+            </a:r>
+          </a:p>
+          <a:p>
+            <a:pPr lvl="1"/>
+            <a:r>
+              <a:rPr lang="en-US"/>
+              <a:t>Second level</a:t>
+            </a:r>
+          </a:p>
+          <a:p>
+            <a:pPr lvl="2"/>
+            <a:r>
+              <a:rPr lang="en-US"/>
+              <a:t>Third level</a:t>
+            </a:r>
+          </a:p>
+          <a:p>
+            <a:pPr lvl="3"/>
+            <a:r>
+              <a:rPr lang="en-US"/>
+              <a:t>Fourth level</a:t>
+            </a:r>
+          </a:p>
+          <a:p>
+            <a:pPr lvl="4"/>
+            <a:r>
+              <a:rPr lang="en-US"/>
+              <a:t>Fifth level</a:t>
+            </a:r>
+          </a:p>
+        </p:txBody>
+      </p:sp>
+      <p:sp>
+        <p:nvSpPr>
+          <p:cNvPr id="4" name="Date Placeholder 3"/>
+          <p:cNvSpPr>
+            <a:spLocks noGrp="1"/>
+          </p:cNvSpPr>
+          <p:nvPr>
+            <p:ph type="dt" sz="half" idx="10"/>
+          </p:nvPr>
+        </p:nvSpPr>
+        <p:spPr/>
+        <p:txBody>
+          <a:bodyPr/>
+          <a:lstStyle/>
+          <a:p>
+            <a:fld id="{241EB5C9-1307-BA42-ABA2-0BC069CD8E7F}" type="datetimeFigureOut">
+              <a:rPr lang="en-US" smtClean="0"/>
+              <a:t>11/14/24</a:t>
+            </a:fld>
+            <a:endParaRPr lang="en-US"/>
+          </a:p>
+        </p:txBody>
+      </p:sp>
+      <p:sp>
+        <p:nvSpPr>
+          <p:cNvPr id="5" name="Footer Placeholder 4"/>
+          <p:cNvSpPr>
+            <a:spLocks noGrp="1"/>
+          </p:cNvSpPr>
+          <p:nvPr>
+            <p:ph type="ftr" sz="quarter" idx="11"/>
+          </p:nvPr>
+        </p:nvSpPr>
+        <p:spPr/>
+        <p:txBody>
+          <a:bodyPr/>
+          <a:lstStyle/>
+          <a:p>
+            <a:endParaRPr lang="en-US"/>
+          </a:p>
+        </p:txBody>
+      </p:sp>
+      <p:sp>
+        <p:nvSpPr>
+          <p:cNvPr id="6" name="Slide Number Placeholder 5"/>
+          <p:cNvSpPr>
+            <a:spLocks noGrp="1"/>
+          </p:cNvSpPr>
+          <p:nvPr>
+            <p:ph type="sldNum" sz="quarter" idx="12"/>
+          </p:nvPr>
+        </p:nvSpPr>
+        <p:spPr/>
+        <p:txBody>
+          <a:bodyPr/>
+          <a:lstStyle/>
+          <a:p>
+            <a:fld id="{C5EF2332-01BF-834F-8236-50238282D533}" type="slidenum">
+              <a:rPr lang="en-US" smtClean="0"/>
+              <a:t>‹#›</a:t>
+            </a:fld>
+            <a:endParaRPr lang="en-US"/>
+          </a:p>
+        </p:txBody>
+      </p:sp>
+      <p:graphicFrame>
+        <p:nvGraphicFramePr>
+          <p:cNvPr id="7" name="Table 6">
+            <a:extLst>
+              <a:ext uri="{FF2B5EF4-FFF2-40B4-BE49-F238E27FC236}">
+                <a16:creationId xmlns:a16="http://schemas.microsoft.com/office/drawing/2014/main" id="{40E5F148-B214-9ED5-96D2-C8C952B333EC}"/>
+              </a:ext>
+            </a:extLst>
+          </p:cNvPr>
+          <p:cNvGraphicFramePr>
+            <a:graphicFrameLocks noGrp="1"/>
+          </p:cNvGraphicFramePr>
+          <p:nvPr userDrawn="1">
+            <p:extLst>
+              <p:ext uri="{D42A27DB-BD31-4B8C-83A1-F6EECF244321}">
+                <p14:modId xmlns:p14="http://schemas.microsoft.com/office/powerpoint/2010/main" val="1121345573"/>
+              </p:ext>
+            </p:extLst>
+          </p:nvPr>
+        </p:nvGraphicFramePr>
+        <p:xfrm>
+          <a:off x="1524000" y="539750"/>
+          <a:ext cx="6096000" cy="914400"/>
+        </p:xfrm>
+        <a:graphic>
+          <a:graphicData uri="http://schemas.openxmlformats.org/drawingml/2006/table">
+            <a:tbl>
+              <a:tblPr firstRow="1" bandRow="1">
+                <a:tableStyleId>{69012ECD-51FC-41F1-AA8D-1B2483CD663E}</a:tableStyleId>
+              </a:tblPr>
+              <a:tblGrid>
+                <a:gridCol w="2032000">
+                  <a:extLst>
+                    <a:ext uri="{9D8B030D-6E8A-4147-A177-3AD203B41FA5}">
+                      <a16:colId xmlns:a16="http://schemas.microsoft.com/office/drawing/2014/main" val="271011269"/>
+                    </a:ext>
+                  </a:extLst>
+                </a:gridCol>
+                <a:gridCol w="2032000">
+                  <a:extLst>
+                    <a:ext uri="{9D8B030D-6E8A-4147-A177-3AD203B41FA5}">
+                      <a16:colId xmlns:a16="http://schemas.microsoft.com/office/drawing/2014/main" val="2080703046"/>
+                    </a:ext>
+                  </a:extLst>
+                </a:gridCol>
+                <a:gridCol w="2032000">
+                  <a:extLst>
+                    <a:ext uri="{9D8B030D-6E8A-4147-A177-3AD203B41FA5}">
+                      <a16:colId xmlns:a16="http://schemas.microsoft.com/office/drawing/2014/main" val="1138284043"/>
+                    </a:ext>
+                  </a:extLst>
+                </a:gridCol>
+              </a:tblGrid>
+              <a:tr h="370840">
+                <a:tc>
+                  <a:txBody>
+                    <a:bodyPr/>
+                    <a:lstStyle/>
+                    <a:p>
+                      <a:endParaRPr lang="en-US" sz="2400" dirty="0"/>
+                    </a:p>
+                  </a:txBody>
+                  <a:tcPr/>
+                </a:tc>
+                <a:tc>
+                  <a:txBody>
+                    <a:bodyPr/>
+                    <a:lstStyle/>
+                    <a:p>
+                      <a:endParaRPr lang="en-US" sz="2400" dirty="0"/>
+                    </a:p>
+                  </a:txBody>
+                  <a:tcPr/>
+                </a:tc>
+                <a:tc>
+                  <a:txBody>
+                    <a:bodyPr/>
+                    <a:lstStyle/>
+                    <a:p>
+                      <a:endParaRPr lang="en-US" sz="2400"/>
+                    </a:p>
+                  </a:txBody>
+                  <a:tcPr/>
+                </a:tc>
+                <a:extLst>
+                  <a:ext uri="{0D108BD9-81ED-4DB2-BD59-A6C34878D82A}">
+                    <a16:rowId xmlns:a16="http://schemas.microsoft.com/office/drawing/2014/main" val="769229322"/>
+                  </a:ext>
+                </a:extLst>
+              </a:tr>
+              <a:tr h="370840">
+                <a:tc>
+                  <a:txBody>
+                    <a:bodyPr/>
+                    <a:lstStyle/>
+                    <a:p>
+                      <a:endParaRPr lang="en-US" sz="2400"/>
+                    </a:p>
+                  </a:txBody>
+                  <a:tcPr/>
+                </a:tc>
+                <a:tc>
+                  <a:txBody>
+                    <a:bodyPr/>
+                    <a:lstStyle/>
+                    <a:p>
+                      <a:endParaRPr lang="en-US" sz="2400" dirty="0"/>
+                    </a:p>
+                  </a:txBody>
+                  <a:tcPr/>
+                </a:tc>
+                <a:tc>
+                  <a:txBody>
+                    <a:bodyPr/>
+                    <a:lstStyle/>
+                    <a:p>
+                      <a:endParaRPr lang="en-US" sz="2400" dirty="0"/>
+                    </a:p>
+                  </a:txBody>
+                  <a:tcPr/>
+                </a:tc>
+                <a:extLst>
+                  <a:ext uri="{0D108BD9-81ED-4DB2-BD59-A6C34878D82A}">
+                    <a16:rowId xmlns:a16="http://schemas.microsoft.com/office/drawing/2014/main" val="184196425"/>
+                  </a:ext>
+                </a:extLst>
+              </a:tr>
+            </a:tbl>
+          </a:graphicData>
+        </a:graphic>
+      </p:graphicFrame>
+    </p:spTree>
+    <p:extLst>
+      <p:ext uri="{BB962C8B-B14F-4D97-AF65-F5344CB8AC3E}">
+        <p14:creationId xmlns:p14="http://schemas.microsoft.com/office/powerpoint/2010/main" val="2939788966"/>
       </p:ext>
     </p:extLst>
   </p:cSld>
@@ -1323,39 +1632,49 @@
         <p:spPr/>
         <p:txBody>
           <a:bodyPr/>
-          <a:lstStyle/>
+          <a:lstStyle>
+            <a:lvl1pPr>
+              <a:defRPr sz="2800"/>
+            </a:lvl1pPr>
+            <a:lvl2pPr>
+              <a:defRPr sz="2800"/>
+            </a:lvl2pPr>
+            <a:lvl3pPr>
+              <a:defRPr sz="2400"/>
+            </a:lvl3pPr>
+          </a:lstStyle>
           <a:p>
             <a:pPr lvl="0"/>
             <a:r>
-              <a:rPr lang="en-US"/>
+              <a:rPr lang="en-US" dirty="0"/>
               <a:t>Click to edit Master text styles</a:t>
             </a:r>
           </a:p>
           <a:p>
             <a:pPr lvl="1"/>
             <a:r>
-              <a:rPr lang="en-US"/>
+              <a:rPr lang="en-US" dirty="0"/>
               <a:t>Second level</a:t>
             </a:r>
           </a:p>
           <a:p>
             <a:pPr lvl="2"/>
             <a:r>
-              <a:rPr lang="en-US"/>
+              <a:rPr lang="en-US" dirty="0"/>
               <a:t>Third level</a:t>
             </a:r>
           </a:p>
           <a:p>
             <a:pPr lvl="3"/>
             <a:r>
-              <a:rPr lang="en-US"/>
+              <a:rPr lang="en-US" dirty="0"/>
               <a:t>Fourth level</a:t>
             </a:r>
           </a:p>
           <a:p>
             <a:pPr lvl="4"/>
             <a:r>
-              <a:rPr lang="en-US"/>
+              <a:rPr lang="en-US" dirty="0"/>
               <a:t>Fifth level</a:t>
             </a:r>
           </a:p>
@@ -1378,7 +1697,7 @@
           <a:p>
             <a:fld id="{241EB5C9-1307-BA42-ABA2-0BC069CD8E7F}" type="datetimeFigureOut">
               <a:rPr lang="en-US" smtClean="0"/>
-              <a:t>1/2/22</a:t>
+              <a:t>11/14/24</a:t>
             </a:fld>
             <a:endParaRPr lang="en-US"/>
           </a:p>
@@ -1436,6 +1755,22 @@
   <p:clrMapOvr>
     <a:masterClrMapping/>
   </p:clrMapOvr>
+  <p:extLst>
+    <p:ext uri="{DCECCB84-F9BA-43D5-87BE-67443E8EF086}">
+      <p15:sldGuideLst xmlns:p15="http://schemas.microsoft.com/office/powerpoint/2012/main">
+        <p15:guide id="1" orient="horz" pos="1620" userDrawn="1">
+          <p15:clr>
+            <a:srgbClr val="FBAE40"/>
+          </p15:clr>
+        </p15:guide>
+        <p15:guide id="2" pos="2880" userDrawn="1">
+          <p15:clr>
+            <a:srgbClr val="FBAE40"/>
+          </p15:clr>
+        </p15:guide>
+      </p15:sldGuideLst>
+    </p:ext>
+  </p:extLst>
 </p:sldLayout>
 </file>
 
@@ -1623,7 +1958,7 @@
           <a:p>
             <a:fld id="{241EB5C9-1307-BA42-ABA2-0BC069CD8E7F}" type="datetimeFigureOut">
               <a:rPr lang="en-US" smtClean="0"/>
-              <a:t>1/2/22</a:t>
+              <a:t>11/14/24</a:t>
             </a:fld>
             <a:endParaRPr lang="en-US"/>
           </a:p>
@@ -1743,7 +2078,7 @@
           <a:bodyPr/>
           <a:lstStyle>
             <a:lvl1pPr>
-              <a:defRPr sz="2100"/>
+              <a:defRPr sz="2400"/>
             </a:lvl1pPr>
             <a:lvl2pPr>
               <a:defRPr sz="1800"/>
@@ -1773,35 +2108,35 @@
           <a:p>
             <a:pPr lvl="0"/>
             <a:r>
-              <a:rPr lang="en-US"/>
+              <a:rPr lang="en-US" dirty="0"/>
               <a:t>Click to edit Master text styles</a:t>
             </a:r>
           </a:p>
           <a:p>
             <a:pPr lvl="1"/>
             <a:r>
-              <a:rPr lang="en-US"/>
+              <a:rPr lang="en-US" dirty="0"/>
               <a:t>Second level</a:t>
             </a:r>
           </a:p>
           <a:p>
             <a:pPr lvl="2"/>
             <a:r>
-              <a:rPr lang="en-US"/>
+              <a:rPr lang="en-US" dirty="0"/>
               <a:t>Third level</a:t>
             </a:r>
           </a:p>
           <a:p>
             <a:pPr lvl="3"/>
             <a:r>
-              <a:rPr lang="en-US"/>
+              <a:rPr lang="en-US" dirty="0"/>
               <a:t>Fourth level</a:t>
             </a:r>
           </a:p>
           <a:p>
             <a:pPr lvl="4"/>
             <a:r>
-              <a:rPr lang="en-US"/>
+              <a:rPr lang="en-US" dirty="0"/>
               <a:t>Fifth level</a:t>
             </a:r>
           </a:p>
@@ -1827,7 +2162,7 @@
           <a:bodyPr/>
           <a:lstStyle>
             <a:lvl1pPr>
-              <a:defRPr sz="2100"/>
+              <a:defRPr sz="2400"/>
             </a:lvl1pPr>
             <a:lvl2pPr>
               <a:defRPr sz="1800"/>
@@ -1857,35 +2192,35 @@
           <a:p>
             <a:pPr lvl="0"/>
             <a:r>
-              <a:rPr lang="en-US"/>
+              <a:rPr lang="en-US" dirty="0"/>
               <a:t>Click to edit Master text styles</a:t>
             </a:r>
           </a:p>
           <a:p>
             <a:pPr lvl="1"/>
             <a:r>
-              <a:rPr lang="en-US"/>
+              <a:rPr lang="en-US" dirty="0"/>
               <a:t>Second level</a:t>
             </a:r>
           </a:p>
           <a:p>
             <a:pPr lvl="2"/>
             <a:r>
-              <a:rPr lang="en-US"/>
+              <a:rPr lang="en-US" dirty="0"/>
               <a:t>Third level</a:t>
             </a:r>
           </a:p>
           <a:p>
             <a:pPr lvl="3"/>
             <a:r>
-              <a:rPr lang="en-US"/>
+              <a:rPr lang="en-US" dirty="0"/>
               <a:t>Fourth level</a:t>
             </a:r>
           </a:p>
           <a:p>
             <a:pPr lvl="4"/>
             <a:r>
-              <a:rPr lang="en-US"/>
+              <a:rPr lang="en-US" dirty="0"/>
               <a:t>Fifth level</a:t>
             </a:r>
           </a:p>
@@ -1908,7 +2243,7 @@
           <a:p>
             <a:fld id="{241EB5C9-1307-BA42-ABA2-0BC069CD8E7F}" type="datetimeFigureOut">
               <a:rPr lang="en-US" smtClean="0"/>
-              <a:t>1/2/22</a:t>
+              <a:t>11/14/24</a:t>
             </a:fld>
             <a:endParaRPr lang="en-US"/>
           </a:p>
@@ -2327,7 +2662,7 @@
           <a:p>
             <a:fld id="{241EB5C9-1307-BA42-ABA2-0BC069CD8E7F}" type="datetimeFigureOut">
               <a:rPr lang="en-US" smtClean="0"/>
-              <a:t>1/2/22</a:t>
+              <a:t>11/14/24</a:t>
             </a:fld>
             <a:endParaRPr lang="en-US"/>
           </a:p>
@@ -2444,7 +2779,7 @@
           <a:p>
             <a:fld id="{241EB5C9-1307-BA42-ABA2-0BC069CD8E7F}" type="datetimeFigureOut">
               <a:rPr lang="en-US" smtClean="0"/>
-              <a:t>1/2/22</a:t>
+              <a:t>11/14/24</a:t>
             </a:fld>
             <a:endParaRPr lang="en-US"/>
           </a:p>
@@ -2539,7 +2874,7 @@
           <a:p>
             <a:fld id="{241EB5C9-1307-BA42-ABA2-0BC069CD8E7F}" type="datetimeFigureOut">
               <a:rPr lang="en-US" smtClean="0"/>
-              <a:t>1/2/22</a:t>
+              <a:t>11/14/24</a:t>
             </a:fld>
             <a:endParaRPr lang="en-US"/>
           </a:p>
@@ -2814,7 +3149,7 @@
           <a:p>
             <a:fld id="{241EB5C9-1307-BA42-ABA2-0BC069CD8E7F}" type="datetimeFigureOut">
               <a:rPr lang="en-US" smtClean="0"/>
-              <a:t>1/2/22</a:t>
+              <a:t>11/14/24</a:t>
             </a:fld>
             <a:endParaRPr lang="en-US"/>
           </a:p>
@@ -3066,7 +3401,7 @@
           <a:p>
             <a:fld id="{241EB5C9-1307-BA42-ABA2-0BC069CD8E7F}" type="datetimeFigureOut">
               <a:rPr lang="en-US" smtClean="0"/>
-              <a:t>1/2/22</a:t>
+              <a:t>11/14/24</a:t>
             </a:fld>
             <a:endParaRPr lang="en-US"/>
           </a:p>
@@ -3277,7 +3612,7 @@
           <a:p>
             <a:fld id="{241EB5C9-1307-BA42-ABA2-0BC069CD8E7F}" type="datetimeFigureOut">
               <a:rPr lang="en-US" smtClean="0"/>
-              <a:t>1/2/22</a:t>
+              <a:t>11/14/24</a:t>
             </a:fld>
             <a:endParaRPr lang="en-US"/>
           </a:p>
@@ -3381,6 +3716,7 @@
     <p:sldLayoutId id="2147483657" r:id="rId9"/>
     <p:sldLayoutId id="2147483658" r:id="rId10"/>
     <p:sldLayoutId id="2147483659" r:id="rId11"/>
+    <p:sldLayoutId id="2147483660" r:id="rId12"/>
   </p:sldLayoutIdLst>
   <p:txStyles>
     <p:titleStyle>
@@ -3766,14 +4102,7 @@
             <a:pPr marL="0" indent="0">
               <a:buNone/>
             </a:pPr>
-            <a:r>
-              <a:rPr lang="en-US" dirty="0"/>
-              <a:t>Hello</a:t>
-            </a:r>
-            <a:r>
-              <a:rPr lang="en-US"/>
-              <a:t>, world.</a:t>
-            </a:r>
+            <a:endParaRPr lang="en-US" dirty="0"/>
           </a:p>
         </p:txBody>
       </p:sp>
@@ -3840,6 +4169,13 @@
           </p:nvPr>
         </p:nvSpPr>
         <p:spPr/>
+        <p:txBody>
+          <a:bodyPr/>
+          <a:lstStyle/>
+          <a:p>
+            <a:endParaRPr lang="en-US"/>
+          </a:p>
+        </p:txBody>
       </p:sp>
     </p:spTree>
     <p:extLst>

</xml_diff>